<commit_message>
Update 4 Januari 2024
</commit_message>
<xml_diff>
--- a/Pertemuan 11 - Javascript.pptx
+++ b/Pertemuan 11 - Javascript.pptx
@@ -27,7 +27,7 @@
   <p:notesSz cx="6858000" cy="9144000"/>
   <p:embeddedFontLst>
     <p:embeddedFont>
-      <p:font typeface="Amatic SC" panose="00000500000000000000" pitchFamily="2" charset="-79"/>
+      <p:font typeface="Amatic SC" panose="020F0502020204030204" pitchFamily="2" charset="-79"/>
       <p:regular r:id="rId17"/>
       <p:bold r:id="rId18"/>
     </p:embeddedFont>
@@ -39,7 +39,7 @@
       <p:boldItalic r:id="rId22"/>
     </p:embeddedFont>
     <p:embeddedFont>
-      <p:font typeface="Nunito" panose="00000500000000000000" pitchFamily="2" charset="0"/>
+      <p:font typeface="Nunito" pitchFamily="2" charset="0"/>
       <p:regular r:id="rId23"/>
       <p:bold r:id="rId24"/>
       <p:italic r:id="rId25"/>
@@ -10967,69 +10967,6 @@
           </a:p>
         </p:txBody>
       </p:sp>
-      <p:sp>
-        <p:nvSpPr>
-          <p:cNvPr id="2" name="TextBox 1">
-            <a:extLst>
-              <a:ext uri="{FF2B5EF4-FFF2-40B4-BE49-F238E27FC236}">
-                <a16:creationId xmlns:a16="http://schemas.microsoft.com/office/drawing/2014/main" id="{8748ECD3-456B-4B71-B903-8229931A0C92}"/>
-              </a:ext>
-            </a:extLst>
-          </p:cNvPr>
-          <p:cNvSpPr txBox="1"/>
-          <p:nvPr/>
-        </p:nvSpPr>
-        <p:spPr>
-          <a:xfrm>
-            <a:off x="2967317" y="4007223"/>
-            <a:ext cx="2959465" cy="338554"/>
-          </a:xfrm>
-          <a:prstGeom prst="rect">
-            <a:avLst/>
-          </a:prstGeom>
-          <a:noFill/>
-        </p:spPr>
-        <p:txBody>
-          <a:bodyPr wrap="none" rtlCol="0">
-            <a:spAutoFit/>
-          </a:bodyPr>
-          <a:lstStyle/>
-          <a:p>
-            <a:r>
-              <a:rPr lang="en-US" sz="1600" b="1" dirty="0">
-                <a:latin typeface="Amatic SC" panose="00000500000000000000" pitchFamily="2" charset="-79"/>
-                <a:cs typeface="Amatic SC" panose="00000500000000000000" pitchFamily="2" charset="-79"/>
-              </a:rPr>
-              <a:t>For junior </a:t>
-            </a:r>
-            <a:r>
-              <a:rPr lang="en-US" sz="1600" b="1" dirty="0" err="1">
-                <a:latin typeface="Amatic SC" panose="00000500000000000000" pitchFamily="2" charset="-79"/>
-                <a:cs typeface="Amatic SC" panose="00000500000000000000" pitchFamily="2" charset="-79"/>
-              </a:rPr>
-              <a:t>highschool</a:t>
-            </a:r>
-            <a:r>
-              <a:rPr lang="en-US" sz="1600" b="1" dirty="0">
-                <a:latin typeface="Amatic SC" panose="00000500000000000000" pitchFamily="2" charset="-79"/>
-                <a:cs typeface="Amatic SC" panose="00000500000000000000" pitchFamily="2" charset="-79"/>
-              </a:rPr>
-              <a:t> curriculum by </a:t>
-            </a:r>
-            <a:r>
-              <a:rPr lang="en-US" sz="1600" b="1" dirty="0" err="1">
-                <a:latin typeface="Amatic SC" panose="00000500000000000000" pitchFamily="2" charset="-79"/>
-                <a:cs typeface="Amatic SC" panose="00000500000000000000" pitchFamily="2" charset="-79"/>
-              </a:rPr>
-              <a:t>rafiknurf</a:t>
-            </a:r>
-            <a:endParaRPr lang="id-ID" sz="1600" b="1" dirty="0">
-              <a:latin typeface="Amatic SC" panose="00000500000000000000" pitchFamily="2" charset="-79"/>
-              <a:cs typeface="Amatic SC" panose="00000500000000000000" pitchFamily="2" charset="-79"/>
-            </a:endParaRPr>
-          </a:p>
-        </p:txBody>
-      </p:sp>
     </p:spTree>
   </p:cSld>
   <p:clrMapOvr>
@@ -14033,7 +13970,7 @@
                   <a:srgbClr val="00FFFF"/>
                 </a:highlight>
               </a:rPr>
-              <a:t>‘’pertemuan10”</a:t>
+              <a:t>‘’pertemuan11”</a:t>
             </a:r>
           </a:p>
           <a:p>
@@ -14324,11 +14261,7 @@
             </a:r>
             <a:r>
               <a:rPr lang="en-US" sz="1400" dirty="0"/>
-              <a:t> variable, console, alert &amp; document </a:t>
-            </a:r>
-            <a:r>
-              <a:rPr lang="en-US" sz="1400"/>
-              <a:t>write pada </a:t>
+              <a:t> variable, console, alert &amp; document write pada </a:t>
             </a:r>
             <a:r>
               <a:rPr lang="en-US" sz="1400" dirty="0" err="1"/>

</xml_diff>